<commit_message>
Made navigation events into a numeric list - Fixes #28
</commit_message>
<xml_diff>
--- a/Slides/Workshop3 - Navigation.pptx
+++ b/Slides/Workshop3 - Navigation.pptx
@@ -234,7 +234,7 @@
           <a:p>
             <a:fld id="{A334C884-B1D7-A043-A4AA-521744755A4B}" type="datetimeFigureOut">
               <a:rPr lang="en-US" smtClean="0"/>
-              <a:t>3/29/2022</a:t>
+              <a:t>4/4/2022</a:t>
             </a:fld>
             <a:endParaRPr lang="en-US"/>
           </a:p>
@@ -1040,7 +1040,7 @@
           <a:p>
             <a:fld id="{E74353ED-ACB2-44BF-A903-985B0AF962B7}" type="datetime1">
               <a:rPr lang="en-US" smtClean="0"/>
-              <a:t>3/29/2022</a:t>
+              <a:t>4/4/2022</a:t>
             </a:fld>
             <a:endParaRPr lang="en-US" dirty="0"/>
           </a:p>
@@ -13140,8 +13140,30 @@
           </a:p>
           <a:p>
             <a:pPr marL="1792773" lvl="1" indent="-896386">
-              <a:buFont typeface="Wingdings" charset="2"/>
-              <a:buChar char="§"/>
+              <a:buFont typeface="+mj-lt"/>
+              <a:buAutoNum type="arabicPeriod"/>
+            </a:pPr>
+            <a:r>
+              <a:rPr lang="en-US" sz="2353" b="1" dirty="0" err="1"/>
+              <a:t>OnNavigatedTo</a:t>
+            </a:r>
+            <a:endParaRPr lang="en-US" sz="2353" b="1" dirty="0"/>
+          </a:p>
+          <a:p>
+            <a:pPr marL="1792773" lvl="1" indent="-896386">
+              <a:buFont typeface="+mj-lt"/>
+              <a:buAutoNum type="arabicPeriod"/>
+            </a:pPr>
+            <a:r>
+              <a:rPr lang="en-US" sz="2353" b="1" dirty="0" err="1"/>
+              <a:t>OnNavigatingFrom</a:t>
+            </a:r>
+            <a:endParaRPr lang="en-US" sz="2353" b="1" dirty="0"/>
+          </a:p>
+          <a:p>
+            <a:pPr marL="1792773" lvl="1" indent="-896386">
+              <a:buFont typeface="+mj-lt"/>
+              <a:buAutoNum type="arabicPeriod"/>
             </a:pPr>
             <a:r>
               <a:rPr lang="en-US" sz="2353" b="1" dirty="0" err="1"/>
@@ -13151,24 +13173,9 @@
           </a:p>
           <a:p>
             <a:pPr marL="1792773" lvl="1" indent="-896386">
-              <a:buFont typeface="Wingdings" charset="2"/>
-              <a:buChar char="§"/>
+              <a:buFont typeface="+mj-lt"/>
+              <a:buAutoNum type="arabicPeriod"/>
             </a:pPr>
-            <a:r>
-              <a:rPr lang="en-US" sz="2353" b="1" dirty="0" err="1"/>
-              <a:t>OnNavigatedTo</a:t>
-            </a:r>
-            <a:endParaRPr lang="en-US" sz="2353" b="1" dirty="0"/>
-          </a:p>
-          <a:p>
-            <a:pPr marL="1792773" lvl="1" indent="-896386">
-              <a:buFont typeface="Wingdings" charset="2"/>
-              <a:buChar char="§"/>
-            </a:pPr>
-            <a:r>
-              <a:rPr lang="en-US" sz="2353" b="1" dirty="0" err="1"/>
-              <a:t>OnNavigatingFrom</a:t>
-            </a:r>
             <a:endParaRPr lang="en-US" sz="2353" b="1" dirty="0"/>
           </a:p>
           <a:p>
@@ -16278,7 +16285,7 @@
           </a:ln>
           <a:extLst>
             <a:ext uri="{C572A759-6A51-4108-AA02-DFA0A04FC94B}">
-              <ma14:wrappingTextBoxFlag xmlns:ma14="http://schemas.microsoft.com/office/mac/drawingml/2011/main" xmlns="" val="1"/>
+              <ma14:wrappingTextBoxFlag xmlns="" xmlns:ma14="http://schemas.microsoft.com/office/mac/drawingml/2011/main" val="1"/>
             </a:ext>
           </a:extLst>
         </p:spPr>
@@ -16505,7 +16512,7 @@
           </a:ln>
           <a:extLst>
             <a:ext uri="{C572A759-6A51-4108-AA02-DFA0A04FC94B}">
-              <ma14:wrappingTextBoxFlag xmlns:ma14="http://schemas.microsoft.com/office/mac/drawingml/2011/main" xmlns="" val="1"/>
+              <ma14:wrappingTextBoxFlag xmlns="" xmlns:ma14="http://schemas.microsoft.com/office/mac/drawingml/2011/main" val="1"/>
             </a:ext>
           </a:extLst>
         </p:spPr>
@@ -17826,7 +17833,7 @@
           </a:ln>
           <a:extLst>
             <a:ext uri="{C572A759-6A51-4108-AA02-DFA0A04FC94B}">
-              <ma14:wrappingTextBoxFlag xmlns:ma14="http://schemas.microsoft.com/office/mac/drawingml/2011/main" xmlns="" val="1"/>
+              <ma14:wrappingTextBoxFlag xmlns="" xmlns:ma14="http://schemas.microsoft.com/office/mac/drawingml/2011/main" val="1"/>
             </a:ext>
           </a:extLst>
         </p:spPr>
@@ -18053,7 +18060,7 @@
           </a:ln>
           <a:extLst>
             <a:ext uri="{C572A759-6A51-4108-AA02-DFA0A04FC94B}">
-              <ma14:wrappingTextBoxFlag xmlns:ma14="http://schemas.microsoft.com/office/mac/drawingml/2011/main" xmlns="" val="1"/>
+              <ma14:wrappingTextBoxFlag xmlns="" xmlns:ma14="http://schemas.microsoft.com/office/mac/drawingml/2011/main" val="1"/>
             </a:ext>
           </a:extLst>
         </p:spPr>

</xml_diff>